<commit_message>
updates to figs, annotate sm things in scripts
</commit_message>
<xml_diff>
--- a/figures/fig1.pptx
+++ b/figures/fig1.pptx
@@ -107,6 +107,11 @@
       </a:defRPr>
     </a:lvl9pPr>
   </p:defaultTextStyle>
+  <p:extLst>
+    <p:ext uri="{EFAFB233-063F-42B5-8137-9DF3F51BA10A}">
+      <p15:sldGuideLst xmlns:p15="http://schemas.microsoft.com/office/powerpoint/2012/main"/>
+    </p:ext>
+  </p:extLst>
 </p:presentation>
 </file>
 
@@ -192,7 +197,7 @@
           <a:p>
             <a:fld id="{8D9DF97D-8677-A94C-9A12-949057094C03}" type="datetimeFigureOut">
               <a:rPr lang="en-US" smtClean="0"/>
-              <a:t>7/17/24</a:t>
+              <a:t>10/8/24</a:t>
             </a:fld>
             <a:endParaRPr lang="en-US"/>
           </a:p>
@@ -693,7 +698,7 @@
           <a:p>
             <a:fld id="{83E02252-0043-594D-88EA-56465CB75C8B}" type="datetimeFigureOut">
               <a:rPr lang="en-US" smtClean="0"/>
-              <a:t>7/17/24</a:t>
+              <a:t>10/8/24</a:t>
             </a:fld>
             <a:endParaRPr lang="en-US"/>
           </a:p>
@@ -891,7 +896,7 @@
           <a:p>
             <a:fld id="{83E02252-0043-594D-88EA-56465CB75C8B}" type="datetimeFigureOut">
               <a:rPr lang="en-US" smtClean="0"/>
-              <a:t>7/17/24</a:t>
+              <a:t>10/8/24</a:t>
             </a:fld>
             <a:endParaRPr lang="en-US"/>
           </a:p>
@@ -1099,7 +1104,7 @@
           <a:p>
             <a:fld id="{83E02252-0043-594D-88EA-56465CB75C8B}" type="datetimeFigureOut">
               <a:rPr lang="en-US" smtClean="0"/>
-              <a:t>7/17/24</a:t>
+              <a:t>10/8/24</a:t>
             </a:fld>
             <a:endParaRPr lang="en-US"/>
           </a:p>
@@ -1297,7 +1302,7 @@
           <a:p>
             <a:fld id="{83E02252-0043-594D-88EA-56465CB75C8B}" type="datetimeFigureOut">
               <a:rPr lang="en-US" smtClean="0"/>
-              <a:t>7/17/24</a:t>
+              <a:t>10/8/24</a:t>
             </a:fld>
             <a:endParaRPr lang="en-US"/>
           </a:p>
@@ -1572,7 +1577,7 @@
           <a:p>
             <a:fld id="{83E02252-0043-594D-88EA-56465CB75C8B}" type="datetimeFigureOut">
               <a:rPr lang="en-US" smtClean="0"/>
-              <a:t>7/17/24</a:t>
+              <a:t>10/8/24</a:t>
             </a:fld>
             <a:endParaRPr lang="en-US"/>
           </a:p>
@@ -1837,7 +1842,7 @@
           <a:p>
             <a:fld id="{83E02252-0043-594D-88EA-56465CB75C8B}" type="datetimeFigureOut">
               <a:rPr lang="en-US" smtClean="0"/>
-              <a:t>7/17/24</a:t>
+              <a:t>10/8/24</a:t>
             </a:fld>
             <a:endParaRPr lang="en-US"/>
           </a:p>
@@ -2249,7 +2254,7 @@
           <a:p>
             <a:fld id="{83E02252-0043-594D-88EA-56465CB75C8B}" type="datetimeFigureOut">
               <a:rPr lang="en-US" smtClean="0"/>
-              <a:t>7/17/24</a:t>
+              <a:t>10/8/24</a:t>
             </a:fld>
             <a:endParaRPr lang="en-US"/>
           </a:p>
@@ -2390,7 +2395,7 @@
           <a:p>
             <a:fld id="{83E02252-0043-594D-88EA-56465CB75C8B}" type="datetimeFigureOut">
               <a:rPr lang="en-US" smtClean="0"/>
-              <a:t>7/17/24</a:t>
+              <a:t>10/8/24</a:t>
             </a:fld>
             <a:endParaRPr lang="en-US"/>
           </a:p>
@@ -2503,7 +2508,7 @@
           <a:p>
             <a:fld id="{83E02252-0043-594D-88EA-56465CB75C8B}" type="datetimeFigureOut">
               <a:rPr lang="en-US" smtClean="0"/>
-              <a:t>7/17/24</a:t>
+              <a:t>10/8/24</a:t>
             </a:fld>
             <a:endParaRPr lang="en-US"/>
           </a:p>
@@ -2814,7 +2819,7 @@
           <a:p>
             <a:fld id="{83E02252-0043-594D-88EA-56465CB75C8B}" type="datetimeFigureOut">
               <a:rPr lang="en-US" smtClean="0"/>
-              <a:t>7/17/24</a:t>
+              <a:t>10/8/24</a:t>
             </a:fld>
             <a:endParaRPr lang="en-US"/>
           </a:p>
@@ -3102,7 +3107,7 @@
           <a:p>
             <a:fld id="{83E02252-0043-594D-88EA-56465CB75C8B}" type="datetimeFigureOut">
               <a:rPr lang="en-US" smtClean="0"/>
-              <a:t>7/17/24</a:t>
+              <a:t>10/8/24</a:t>
             </a:fld>
             <a:endParaRPr lang="en-US"/>
           </a:p>
@@ -3343,7 +3348,7 @@
           <a:p>
             <a:fld id="{83E02252-0043-594D-88EA-56465CB75C8B}" type="datetimeFigureOut">
               <a:rPr lang="en-US" smtClean="0"/>
-              <a:t>7/17/24</a:t>
+              <a:t>10/8/24</a:t>
             </a:fld>
             <a:endParaRPr lang="en-US"/>
           </a:p>
@@ -5274,76 +5279,6 @@
           </a:p>
         </p:txBody>
       </p:sp>
-      <p:sp>
-        <p:nvSpPr>
-          <p:cNvPr id="17" name="TextBox 16">
-            <a:extLst>
-              <a:ext uri="{FF2B5EF4-FFF2-40B4-BE49-F238E27FC236}">
-                <a16:creationId xmlns:a16="http://schemas.microsoft.com/office/drawing/2014/main" id="{F4F15B63-F80D-9116-CE47-521765E60751}"/>
-              </a:ext>
-            </a:extLst>
-          </p:cNvPr>
-          <p:cNvSpPr txBox="1"/>
-          <p:nvPr/>
-        </p:nvSpPr>
-        <p:spPr>
-          <a:xfrm>
-            <a:off x="4594403" y="6448459"/>
-            <a:ext cx="3003194" cy="369332"/>
-          </a:xfrm>
-          <a:prstGeom prst="rect">
-            <a:avLst/>
-          </a:prstGeom>
-          <a:noFill/>
-        </p:spPr>
-        <p:txBody>
-          <a:bodyPr wrap="none" rtlCol="0">
-            <a:spAutoFit/>
-          </a:bodyPr>
-          <a:lstStyle/>
-          <a:p>
-            <a:r>
-              <a:rPr lang="en-US" dirty="0"/>
-              <a:t>Means of Defining Functions</a:t>
-            </a:r>
-          </a:p>
-        </p:txBody>
-      </p:sp>
-      <p:sp>
-        <p:nvSpPr>
-          <p:cNvPr id="18" name="TextBox 17">
-            <a:extLst>
-              <a:ext uri="{FF2B5EF4-FFF2-40B4-BE49-F238E27FC236}">
-                <a16:creationId xmlns:a16="http://schemas.microsoft.com/office/drawing/2014/main" id="{F638226A-3F58-D023-7DB8-28A29186D213}"/>
-              </a:ext>
-            </a:extLst>
-          </p:cNvPr>
-          <p:cNvSpPr txBox="1"/>
-          <p:nvPr/>
-        </p:nvSpPr>
-        <p:spPr>
-          <a:xfrm rot="5400000">
-            <a:off x="7780152" y="3283745"/>
-            <a:ext cx="3541034" cy="369332"/>
-          </a:xfrm>
-          <a:prstGeom prst="rect">
-            <a:avLst/>
-          </a:prstGeom>
-          <a:noFill/>
-        </p:spPr>
-        <p:txBody>
-          <a:bodyPr wrap="none" rtlCol="0">
-            <a:spAutoFit/>
-          </a:bodyPr>
-          <a:lstStyle/>
-          <a:p>
-            <a:r>
-              <a:rPr lang="en-US" dirty="0"/>
-              <a:t>Means of Elemental Architectures</a:t>
-            </a:r>
-          </a:p>
-        </p:txBody>
-      </p:sp>
       <p:pic>
         <p:nvPicPr>
           <p:cNvPr id="22" name="Picture 21">
@@ -5394,7 +5329,7 @@
         </p:blipFill>
         <p:spPr>
           <a:xfrm>
-            <a:off x="9803076" y="772224"/>
+            <a:off x="9243960" y="772224"/>
             <a:ext cx="730056" cy="1575646"/>
           </a:xfrm>
           <a:prstGeom prst="rect">

</xml_diff>